<commit_message>
change color to red
</commit_message>
<xml_diff>
--- a/Slide_Template/TSLA deck_final_v4.pptx
+++ b/Slide_Template/TSLA deck_final_v4.pptx
@@ -4284,7 +4284,7 @@
           <a:graphicData uri="http://schemas.openxmlformats.org/presentationml/2006/ole">
             <mc:AlternateContent xmlns:mc="http://schemas.openxmlformats.org/markup-compatibility/2006">
               <mc:Choice xmlns:v="urn:schemas-microsoft-com:vml" Requires="v">
-                <p:oleObj spid="_x0000_s4212" name="think-cell 幻灯片" r:id="rId4" imgW="5715" imgH="5715" progId="TCLayout.ActiveDocument.1">
+                <p:oleObj spid="_x0000_s4217" name="think-cell 幻灯片" r:id="rId4" imgW="5715" imgH="5715" progId="TCLayout.ActiveDocument.1">
                   <p:embed/>
                 </p:oleObj>
               </mc:Choice>
@@ -10138,7 +10138,7 @@
           <a:graphicData uri="http://schemas.openxmlformats.org/presentationml/2006/ole">
             <mc:AlternateContent xmlns:mc="http://schemas.openxmlformats.org/markup-compatibility/2006">
               <mc:Choice xmlns:v="urn:schemas-microsoft-com:vml" Requires="v">
-                <p:oleObj spid="_x0000_s3223" name="think-cell 幻灯片" r:id="rId5" imgW="5715" imgH="5715" progId="TCLayout.ActiveDocument.1">
+                <p:oleObj spid="_x0000_s3228" name="think-cell 幻灯片" r:id="rId5" imgW="5715" imgH="5715" progId="TCLayout.ActiveDocument.1">
                   <p:embed/>
                 </p:oleObj>
               </mc:Choice>
@@ -12284,7 +12284,7 @@
           <a:graphicData uri="http://schemas.openxmlformats.org/presentationml/2006/ole">
             <mc:AlternateContent xmlns:mc="http://schemas.openxmlformats.org/markup-compatibility/2006">
               <mc:Choice xmlns:v="urn:schemas-microsoft-com:vml" Requires="v">
-                <p:oleObj spid="_x0000_s1383" name="think-cell 幻灯片" r:id="rId5" imgW="5715" imgH="5715" progId="TCLayout.ActiveDocument.1">
+                <p:oleObj spid="_x0000_s1388" name="think-cell 幻灯片" r:id="rId5" imgW="5715" imgH="5715" progId="TCLayout.ActiveDocument.1">
                   <p:embed/>
                 </p:oleObj>
               </mc:Choice>
@@ -14026,7 +14026,7 @@
           <a:graphicData uri="http://schemas.openxmlformats.org/presentationml/2006/ole">
             <mc:AlternateContent xmlns:mc="http://schemas.openxmlformats.org/markup-compatibility/2006">
               <mc:Choice xmlns:v="urn:schemas-microsoft-com:vml" Requires="v">
-                <p:oleObj spid="_x0000_s6260" name="think-cell 幻灯片" r:id="rId6" imgW="5715" imgH="5715" progId="TCLayout.ActiveDocument.1">
+                <p:oleObj spid="_x0000_s6265" name="think-cell 幻灯片" r:id="rId6" imgW="5715" imgH="5715" progId="TCLayout.ActiveDocument.1">
                   <p:embed/>
                 </p:oleObj>
               </mc:Choice>
@@ -14199,7 +14199,7 @@
                 <a:noFill/>
                 <a:ln>
                   <a:solidFill>
-                    <a:srgbClr val="FD8D02"/>
+                    <a:srgbClr val="BC0000"/>
                   </a:solidFill>
                 </a:ln>
               </p:spPr>
@@ -14550,7 +14550,7 @@
                   <a:avLst/>
                 </a:prstGeom>
                 <a:solidFill>
-                  <a:srgbClr val="FD8D02"/>
+                  <a:srgbClr val="BC0000"/>
                 </a:solidFill>
                 <a:ln>
                   <a:noFill/>
@@ -14736,7 +14736,7 @@
                 <a:noFill/>
                 <a:ln>
                   <a:solidFill>
-                    <a:srgbClr val="FD8D02"/>
+                    <a:srgbClr val="BC0000"/>
                   </a:solidFill>
                 </a:ln>
               </p:spPr>
@@ -15123,7 +15123,7 @@
                   <a:avLst/>
                 </a:prstGeom>
                 <a:solidFill>
-                  <a:srgbClr val="FD8D02"/>
+                  <a:srgbClr val="BC0000"/>
                 </a:solidFill>
                 <a:ln>
                   <a:noFill/>
@@ -15636,9 +15636,9 @@
               <p:grpSpPr>
                 <a:xfrm>
                   <a:off x="1582009" y="1950102"/>
-                  <a:ext cx="1127862" cy="1897055"/>
+                  <a:ext cx="1127862" cy="2117819"/>
                   <a:chOff x="1910385" y="1950102"/>
-                  <a:chExt cx="1127862" cy="1897055"/>
+                  <a:chExt cx="1127862" cy="2117819"/>
                 </a:xfrm>
               </p:grpSpPr>
               <p:sp>
@@ -15683,7 +15683,7 @@
                     </a:pathLst>
                   </a:custGeom>
                   <a:solidFill>
-                    <a:schemeClr val="accent1"/>
+                    <a:srgbClr val="BC0000"/>
                   </a:solidFill>
                   <a:effectLst>
                     <a:outerShdw blurRad="50800" dist="38100" dir="2700000" algn="tl" rotWithShape="0">
@@ -15739,7 +15739,7 @@
                 </p:nvSpPr>
                 <p:spPr>
                   <a:xfrm>
-                    <a:off x="1910385" y="3496685"/>
+                    <a:off x="1910385" y="3717449"/>
                     <a:ext cx="1116000" cy="350472"/>
                   </a:xfrm>
                   <a:custGeom>
@@ -17870,7 +17870,7 @@
               </p:nvSpPr>
               <p:spPr>
                 <a:xfrm>
-                  <a:off x="2975816" y="3633604"/>
+                  <a:off x="2975816" y="3671921"/>
                   <a:ext cx="1209581" cy="396000"/>
                 </a:xfrm>
                 <a:prstGeom prst="rect">
@@ -18310,10 +18310,10 @@
               </p:nvGrpSpPr>
               <p:grpSpPr>
                 <a:xfrm>
-                  <a:off x="10025838" y="1977558"/>
-                  <a:ext cx="1209581" cy="2090363"/>
-                  <a:chOff x="9850877" y="1977558"/>
-                  <a:chExt cx="1209581" cy="2090363"/>
+                  <a:off x="10025838" y="1950102"/>
+                  <a:ext cx="1209581" cy="2117819"/>
+                  <a:chOff x="9850877" y="1950102"/>
+                  <a:chExt cx="1209581" cy="2117819"/>
                 </a:xfrm>
               </p:grpSpPr>
               <p:sp>
@@ -18403,14 +18403,14 @@
                 </p:nvSpPr>
                 <p:spPr>
                   <a:xfrm>
-                    <a:off x="9850877" y="1977558"/>
+                    <a:off x="9850877" y="1950102"/>
                     <a:ext cx="1209581" cy="396000"/>
                   </a:xfrm>
                   <a:prstGeom prst="rect">
                     <a:avLst/>
                   </a:prstGeom>
                   <a:solidFill>
-                    <a:srgbClr val="F8931D"/>
+                    <a:srgbClr val="BC0000"/>
                   </a:solidFill>
                   <a:ln>
                     <a:solidFill>
@@ -18677,7 +18677,7 @@
               </p:blipFill>
               <p:spPr>
                 <a:xfrm>
-                  <a:off x="7872698" y="2278741"/>
+                  <a:off x="7853648" y="2288266"/>
                   <a:ext cx="345600" cy="345600"/>
                 </a:xfrm>
                 <a:prstGeom prst="rect">

</xml_diff>